<commit_message>
Add deep learning example. Improve classifiers
</commit_message>
<xml_diff>
--- a/02-MachineLearningHandsOn.pptx
+++ b/02-MachineLearningHandsOn.pptx
@@ -5,7 +5,7 @@
     <p:sldMasterId id="2147483648" r:id="rId1"/>
   </p:sldMasterIdLst>
   <p:notesMasterIdLst>
-    <p:notesMasterId r:id="rId20"/>
+    <p:notesMasterId r:id="rId26"/>
   </p:notesMasterIdLst>
   <p:sldIdLst>
     <p:sldId id="256" r:id="rId2"/>
@@ -19,13 +19,19 @@
     <p:sldId id="262" r:id="rId10"/>
     <p:sldId id="264" r:id="rId11"/>
     <p:sldId id="263" r:id="rId12"/>
-    <p:sldId id="265" r:id="rId13"/>
-    <p:sldId id="266" r:id="rId14"/>
-    <p:sldId id="267" r:id="rId15"/>
-    <p:sldId id="268" r:id="rId16"/>
-    <p:sldId id="271" r:id="rId17"/>
-    <p:sldId id="272" r:id="rId18"/>
-    <p:sldId id="273" r:id="rId19"/>
+    <p:sldId id="274" r:id="rId13"/>
+    <p:sldId id="275" r:id="rId14"/>
+    <p:sldId id="265" r:id="rId15"/>
+    <p:sldId id="266" r:id="rId16"/>
+    <p:sldId id="267" r:id="rId17"/>
+    <p:sldId id="268" r:id="rId18"/>
+    <p:sldId id="271" r:id="rId19"/>
+    <p:sldId id="276" r:id="rId20"/>
+    <p:sldId id="277" r:id="rId21"/>
+    <p:sldId id="278" r:id="rId22"/>
+    <p:sldId id="279" r:id="rId23"/>
+    <p:sldId id="272" r:id="rId24"/>
+    <p:sldId id="273" r:id="rId25"/>
   </p:sldIdLst>
   <p:sldSz cx="9144000" cy="6858000" type="screen4x3"/>
   <p:notesSz cx="6858000" cy="9144000"/>
@@ -3978,6 +3984,201 @@
           <a:p>
             <a:r>
               <a:rPr lang="en-US" dirty="0" smtClean="0"/>
+              <a:t>Training Data</a:t>
+            </a:r>
+            <a:endParaRPr lang="en-US" dirty="0"/>
+          </a:p>
+        </p:txBody>
+      </p:sp>
+      <p:sp>
+        <p:nvSpPr>
+          <p:cNvPr id="3" name="Content Placeholder 2"/>
+          <p:cNvSpPr>
+            <a:spLocks noGrp="1"/>
+          </p:cNvSpPr>
+          <p:nvPr>
+            <p:ph idx="1"/>
+          </p:nvPr>
+        </p:nvSpPr>
+        <p:spPr/>
+        <p:txBody>
+          <a:bodyPr/>
+          <a:lstStyle/>
+          <a:p>
+            <a:r>
+              <a:rPr lang="en-US" dirty="0" smtClean="0"/>
+              <a:t>For most cases, available data is split into:</a:t>
+            </a:r>
+          </a:p>
+          <a:p>
+            <a:pPr lvl="1"/>
+            <a:r>
+              <a:rPr lang="en-US" dirty="0" smtClean="0"/>
+              <a:t>Training data (actively used to adjust parameters)</a:t>
+            </a:r>
+          </a:p>
+          <a:p>
+            <a:pPr lvl="1"/>
+            <a:r>
+              <a:rPr lang="en-US" dirty="0" smtClean="0"/>
+              <a:t>Test (measure accuracy of ML and further update)</a:t>
+            </a:r>
+          </a:p>
+          <a:p>
+            <a:pPr lvl="1"/>
+            <a:r>
+              <a:rPr lang="en-US" dirty="0" smtClean="0"/>
+              <a:t>Validation (Completely separate set of data used only after ML is ‘fully trained’)</a:t>
+            </a:r>
+          </a:p>
+          <a:p>
+            <a:pPr lvl="1"/>
+            <a:endParaRPr lang="en-US" dirty="0"/>
+          </a:p>
+          <a:p>
+            <a:pPr lvl="1"/>
+            <a:r>
+              <a:rPr lang="en-US" dirty="0" smtClean="0"/>
+              <a:t>Test/Validation names sometimes used other way around</a:t>
+            </a:r>
+          </a:p>
+          <a:p>
+            <a:pPr lvl="1"/>
+            <a:endParaRPr lang="en-US" dirty="0"/>
+          </a:p>
+        </p:txBody>
+      </p:sp>
+    </p:spTree>
+    <p:extLst>
+      <p:ext uri="{BB962C8B-B14F-4D97-AF65-F5344CB8AC3E}">
+        <p14:creationId xmlns:p14="http://schemas.microsoft.com/office/powerpoint/2010/main" val="3781612743"/>
+      </p:ext>
+    </p:extLst>
+  </p:cSld>
+  <p:clrMapOvr>
+    <a:masterClrMapping/>
+  </p:clrMapOvr>
+</p:sld>
+</file>
+
+<file path=ppt/slides/slide13.xml><?xml version="1.0" encoding="utf-8"?>
+<p:sld xmlns:a="http://schemas.openxmlformats.org/drawingml/2006/main" xmlns:r="http://schemas.openxmlformats.org/officeDocument/2006/relationships" xmlns:p="http://schemas.openxmlformats.org/presentationml/2006/main">
+  <p:cSld>
+    <p:spTree>
+      <p:nvGrpSpPr>
+        <p:cNvPr id="1" name=""/>
+        <p:cNvGrpSpPr/>
+        <p:nvPr/>
+      </p:nvGrpSpPr>
+      <p:grpSpPr>
+        <a:xfrm>
+          <a:off x="0" y="0"/>
+          <a:ext cx="0" cy="0"/>
+          <a:chOff x="0" y="0"/>
+          <a:chExt cx="0" cy="0"/>
+        </a:xfrm>
+      </p:grpSpPr>
+      <p:sp>
+        <p:nvSpPr>
+          <p:cNvPr id="2" name="Title 1"/>
+          <p:cNvSpPr>
+            <a:spLocks noGrp="1"/>
+          </p:cNvSpPr>
+          <p:nvPr>
+            <p:ph type="title"/>
+          </p:nvPr>
+        </p:nvSpPr>
+        <p:spPr/>
+        <p:txBody>
+          <a:bodyPr/>
+          <a:lstStyle/>
+          <a:p>
+            <a:r>
+              <a:rPr lang="en-US" dirty="0" smtClean="0"/>
+              <a:t>Cross Validation</a:t>
+            </a:r>
+            <a:endParaRPr lang="en-US" dirty="0"/>
+          </a:p>
+        </p:txBody>
+      </p:sp>
+      <p:sp>
+        <p:nvSpPr>
+          <p:cNvPr id="3" name="Content Placeholder 2"/>
+          <p:cNvSpPr>
+            <a:spLocks noGrp="1"/>
+          </p:cNvSpPr>
+          <p:nvPr>
+            <p:ph idx="1"/>
+          </p:nvPr>
+        </p:nvSpPr>
+        <p:spPr/>
+        <p:txBody>
+          <a:bodyPr/>
+          <a:lstStyle/>
+          <a:p>
+            <a:r>
+              <a:rPr lang="en-US" dirty="0" smtClean="0"/>
+              <a:t>Split data into train/test. E.g. 5-fold takes 80% for training and 20% for test.</a:t>
+            </a:r>
+          </a:p>
+          <a:p>
+            <a:r>
+              <a:rPr lang="en-US" dirty="0" smtClean="0"/>
+              <a:t>Extreme case is Leave One Out (LOO) where training happens on all but 1 example. Then classify that one example. Then leave out next example/train/test on that example. Repeat until each sample has been left out.</a:t>
+            </a:r>
+          </a:p>
+          <a:p>
+            <a:endParaRPr lang="en-US" dirty="0"/>
+          </a:p>
+        </p:txBody>
+      </p:sp>
+    </p:spTree>
+    <p:extLst>
+      <p:ext uri="{BB962C8B-B14F-4D97-AF65-F5344CB8AC3E}">
+        <p14:creationId xmlns:p14="http://schemas.microsoft.com/office/powerpoint/2010/main" val="8950971"/>
+      </p:ext>
+    </p:extLst>
+  </p:cSld>
+  <p:clrMapOvr>
+    <a:masterClrMapping/>
+  </p:clrMapOvr>
+</p:sld>
+</file>
+
+<file path=ppt/slides/slide14.xml><?xml version="1.0" encoding="utf-8"?>
+<p:sld xmlns:a="http://schemas.openxmlformats.org/drawingml/2006/main" xmlns:r="http://schemas.openxmlformats.org/officeDocument/2006/relationships" xmlns:p="http://schemas.openxmlformats.org/presentationml/2006/main">
+  <p:cSld>
+    <p:spTree>
+      <p:nvGrpSpPr>
+        <p:cNvPr id="1" name=""/>
+        <p:cNvGrpSpPr/>
+        <p:nvPr/>
+      </p:nvGrpSpPr>
+      <p:grpSpPr>
+        <a:xfrm>
+          <a:off x="0" y="0"/>
+          <a:ext cx="0" cy="0"/>
+          <a:chOff x="0" y="0"/>
+          <a:chExt cx="0" cy="0"/>
+        </a:xfrm>
+      </p:grpSpPr>
+      <p:sp>
+        <p:nvSpPr>
+          <p:cNvPr id="2" name="Title 1"/>
+          <p:cNvSpPr>
+            <a:spLocks noGrp="1"/>
+          </p:cNvSpPr>
+          <p:nvPr>
+            <p:ph type="title"/>
+          </p:nvPr>
+        </p:nvSpPr>
+        <p:spPr/>
+        <p:txBody>
+          <a:bodyPr/>
+          <a:lstStyle/>
+          <a:p>
+            <a:r>
+              <a:rPr lang="en-US" dirty="0" smtClean="0"/>
               <a:t>Models</a:t>
             </a:r>
             <a:endParaRPr lang="en-US" dirty="0"/>
@@ -4044,7 +4245,7 @@
 </p:sld>
 </file>
 
-<file path=ppt/slides/slide13.xml><?xml version="1.0" encoding="utf-8"?>
+<file path=ppt/slides/slide15.xml><?xml version="1.0" encoding="utf-8"?>
 <p:sld xmlns:a="http://schemas.openxmlformats.org/drawingml/2006/main" xmlns:r="http://schemas.openxmlformats.org/officeDocument/2006/relationships" xmlns:p="http://schemas.openxmlformats.org/presentationml/2006/main">
   <p:cSld>
     <p:spTree>
@@ -4157,7 +4358,7 @@
 </p:sld>
 </file>
 
-<file path=ppt/slides/slide14.xml><?xml version="1.0" encoding="utf-8"?>
+<file path=ppt/slides/slide16.xml><?xml version="1.0" encoding="utf-8"?>
 <p:sld xmlns:a="http://schemas.openxmlformats.org/drawingml/2006/main" xmlns:r="http://schemas.openxmlformats.org/officeDocument/2006/relationships" xmlns:p="http://schemas.openxmlformats.org/presentationml/2006/main">
   <p:cSld>
     <p:spTree>
@@ -5545,7 +5746,7 @@
 </p:sld>
 </file>
 
-<file path=ppt/slides/slide15.xml><?xml version="1.0" encoding="utf-8"?>
+<file path=ppt/slides/slide17.xml><?xml version="1.0" encoding="utf-8"?>
 <p:sld xmlns:a="http://schemas.openxmlformats.org/drawingml/2006/main" xmlns:r="http://schemas.openxmlformats.org/officeDocument/2006/relationships" xmlns:p="http://schemas.openxmlformats.org/presentationml/2006/main">
   <p:cSld>
     <p:spTree>
@@ -5725,195 +5926,6 @@
     <p:extLst>
       <p:ext uri="{BB962C8B-B14F-4D97-AF65-F5344CB8AC3E}">
         <p14:creationId xmlns:p14="http://schemas.microsoft.com/office/powerpoint/2010/main" val="3498530554"/>
-      </p:ext>
-    </p:extLst>
-  </p:cSld>
-  <p:clrMapOvr>
-    <a:masterClrMapping/>
-  </p:clrMapOvr>
-  <p:timing>
-    <p:tnLst>
-      <p:par>
-        <p:cTn xmlns:p14="http://schemas.microsoft.com/office/powerpoint/2010/main" id="1" dur="indefinite" restart="never" nodeType="tmRoot"/>
-      </p:par>
-    </p:tnLst>
-  </p:timing>
-</p:sld>
-</file>
-
-<file path=ppt/slides/slide16.xml><?xml version="1.0" encoding="utf-8"?>
-<p:sld xmlns:a="http://schemas.openxmlformats.org/drawingml/2006/main" xmlns:r="http://schemas.openxmlformats.org/officeDocument/2006/relationships" xmlns:p="http://schemas.openxmlformats.org/presentationml/2006/main">
-  <p:cSld>
-    <p:spTree>
-      <p:nvGrpSpPr>
-        <p:cNvPr id="1" name=""/>
-        <p:cNvGrpSpPr/>
-        <p:nvPr/>
-      </p:nvGrpSpPr>
-      <p:grpSpPr>
-        <a:xfrm>
-          <a:off x="0" y="0"/>
-          <a:ext cx="0" cy="0"/>
-          <a:chOff x="0" y="0"/>
-          <a:chExt cx="0" cy="0"/>
-        </a:xfrm>
-      </p:grpSpPr>
-      <p:sp>
-        <p:nvSpPr>
-          <p:cNvPr id="2" name="Title 1"/>
-          <p:cNvSpPr>
-            <a:spLocks noGrp="1"/>
-          </p:cNvSpPr>
-          <p:nvPr>
-            <p:ph type="title"/>
-          </p:nvPr>
-        </p:nvSpPr>
-        <p:spPr/>
-        <p:txBody>
-          <a:bodyPr/>
-          <a:lstStyle/>
-          <a:p>
-            <a:r>
-              <a:rPr lang="en-US" dirty="0" smtClean="0"/>
-              <a:t>When Have I Learned It?</a:t>
-            </a:r>
-            <a:endParaRPr lang="en-US" dirty="0"/>
-          </a:p>
-        </p:txBody>
-      </p:sp>
-      <p:sp>
-        <p:nvSpPr>
-          <p:cNvPr id="3" name="Content Placeholder 2"/>
-          <p:cNvSpPr>
-            <a:spLocks noGrp="1"/>
-          </p:cNvSpPr>
-          <p:nvPr>
-            <p:ph idx="1"/>
-          </p:nvPr>
-        </p:nvSpPr>
-        <p:spPr/>
-        <p:txBody>
-          <a:bodyPr/>
-          <a:lstStyle/>
-          <a:p>
-            <a:r>
-              <a:rPr lang="en-US" dirty="0" smtClean="0"/>
-              <a:t>In most cases, there is no way to know the ‘Perfectly Right’ model</a:t>
-            </a:r>
-          </a:p>
-          <a:p>
-            <a:r>
-              <a:rPr lang="en-US" dirty="0" smtClean="0"/>
-              <a:t>Most ML methods are iterative</a:t>
-            </a:r>
-          </a:p>
-          <a:p>
-            <a:pPr lvl="1"/>
-            <a:r>
-              <a:rPr lang="en-US" dirty="0" smtClean="0"/>
-              <a:t>Keep trying to improve</a:t>
-            </a:r>
-          </a:p>
-          <a:p>
-            <a:pPr lvl="1"/>
-            <a:r>
-              <a:rPr lang="en-US" dirty="0" smtClean="0"/>
-              <a:t>Stop when no &lt;significant&gt; improvement</a:t>
-            </a:r>
-          </a:p>
-          <a:p>
-            <a:pPr lvl="1"/>
-            <a:r>
-              <a:rPr lang="en-US" dirty="0" smtClean="0"/>
-              <a:t>Stop when certain amount of time elapsed</a:t>
-            </a:r>
-            <a:endParaRPr lang="en-US" dirty="0"/>
-          </a:p>
-        </p:txBody>
-      </p:sp>
-    </p:spTree>
-    <p:extLst>
-      <p:ext uri="{BB962C8B-B14F-4D97-AF65-F5344CB8AC3E}">
-        <p14:creationId xmlns:p14="http://schemas.microsoft.com/office/powerpoint/2010/main" val="1114066969"/>
-      </p:ext>
-    </p:extLst>
-  </p:cSld>
-  <p:clrMapOvr>
-    <a:masterClrMapping/>
-  </p:clrMapOvr>
-  <p:timing>
-    <p:tnLst>
-      <p:par>
-        <p:cTn xmlns:p14="http://schemas.microsoft.com/office/powerpoint/2010/main" id="1" dur="indefinite" restart="never" nodeType="tmRoot"/>
-      </p:par>
-    </p:tnLst>
-  </p:timing>
-</p:sld>
-</file>
-
-<file path=ppt/slides/slide17.xml><?xml version="1.0" encoding="utf-8"?>
-<p:sld xmlns:a="http://schemas.openxmlformats.org/drawingml/2006/main" xmlns:r="http://schemas.openxmlformats.org/officeDocument/2006/relationships" xmlns:p="http://schemas.openxmlformats.org/presentationml/2006/main">
-  <p:cSld>
-    <p:spTree>
-      <p:nvGrpSpPr>
-        <p:cNvPr id="1" name=""/>
-        <p:cNvGrpSpPr/>
-        <p:nvPr/>
-      </p:nvGrpSpPr>
-      <p:grpSpPr>
-        <a:xfrm>
-          <a:off x="0" y="0"/>
-          <a:ext cx="0" cy="0"/>
-          <a:chOff x="0" y="0"/>
-          <a:chExt cx="0" cy="0"/>
-        </a:xfrm>
-      </p:grpSpPr>
-      <p:sp>
-        <p:nvSpPr>
-          <p:cNvPr id="2" name="Title 1"/>
-          <p:cNvSpPr>
-            <a:spLocks noGrp="1"/>
-          </p:cNvSpPr>
-          <p:nvPr>
-            <p:ph type="title"/>
-          </p:nvPr>
-        </p:nvSpPr>
-        <p:spPr/>
-        <p:txBody>
-          <a:bodyPr/>
-          <a:lstStyle/>
-          <a:p>
-            <a:r>
-              <a:rPr lang="en-US" dirty="0" smtClean="0"/>
-              <a:t>Questions</a:t>
-            </a:r>
-            <a:endParaRPr lang="en-US" dirty="0"/>
-          </a:p>
-        </p:txBody>
-      </p:sp>
-      <p:sp>
-        <p:nvSpPr>
-          <p:cNvPr id="3" name="Content Placeholder 2"/>
-          <p:cNvSpPr>
-            <a:spLocks noGrp="1"/>
-          </p:cNvSpPr>
-          <p:nvPr>
-            <p:ph idx="1"/>
-          </p:nvPr>
-        </p:nvSpPr>
-        <p:spPr/>
-        <p:txBody>
-          <a:bodyPr/>
-          <a:lstStyle/>
-          <a:p>
-            <a:endParaRPr lang="en-US"/>
-          </a:p>
-        </p:txBody>
-      </p:sp>
-    </p:spTree>
-    <p:extLst>
-      <p:ext uri="{BB962C8B-B14F-4D97-AF65-F5344CB8AC3E}">
-        <p14:creationId xmlns:p14="http://schemas.microsoft.com/office/powerpoint/2010/main" val="4073609037"/>
       </p:ext>
     </p:extLst>
   </p:cSld>
@@ -5964,7 +5976,7 @@
           <a:p>
             <a:r>
               <a:rPr lang="en-US" dirty="0" smtClean="0"/>
-              <a:t>Starting Your Session</a:t>
+              <a:t>When Have I Learned It?</a:t>
             </a:r>
             <a:endParaRPr lang="en-US" dirty="0"/>
           </a:p>
@@ -5972,33 +5984,49 @@
       </p:sp>
       <p:sp>
         <p:nvSpPr>
-          <p:cNvPr id="3" name="TextBox 2"/>
-          <p:cNvSpPr txBox="1"/>
-          <p:nvPr/>
-        </p:nvSpPr>
-        <p:spPr>
-          <a:xfrm>
-            <a:off x="1211868" y="1409338"/>
-            <a:ext cx="967670" cy="369332"/>
-          </a:xfrm>
-          <a:prstGeom prst="rect">
-            <a:avLst/>
-          </a:prstGeom>
-          <a:noFill/>
-        </p:spPr>
-        <p:txBody>
-          <a:bodyPr wrap="none" rtlCol="0">
-            <a:spAutoFit/>
-          </a:bodyPr>
+          <p:cNvPr id="3" name="Content Placeholder 2"/>
+          <p:cNvSpPr>
+            <a:spLocks noGrp="1"/>
+          </p:cNvSpPr>
+          <p:nvPr>
+            <p:ph idx="1"/>
+          </p:nvPr>
+        </p:nvSpPr>
+        <p:spPr/>
+        <p:txBody>
+          <a:bodyPr/>
           <a:lstStyle/>
           <a:p>
             <a:r>
               <a:rPr lang="en-US" dirty="0" smtClean="0"/>
-              <a:t>Guide </a:t>
-            </a:r>
-            <a:r>
-              <a:rPr lang="is-IS" smtClean="0"/>
-              <a:t>…</a:t>
+              <a:t>In most cases, there is no way to know the ‘Perfectly Right’ model</a:t>
+            </a:r>
+          </a:p>
+          <a:p>
+            <a:r>
+              <a:rPr lang="en-US" dirty="0" smtClean="0"/>
+              <a:t>Most ML methods are iterative</a:t>
+            </a:r>
+          </a:p>
+          <a:p>
+            <a:pPr lvl="1"/>
+            <a:r>
+              <a:rPr lang="en-US" dirty="0" smtClean="0"/>
+              <a:t>Keep trying to improve</a:t>
+            </a:r>
+          </a:p>
+          <a:p>
+            <a:pPr lvl="1"/>
+            <a:r>
+              <a:rPr lang="en-US" dirty="0" smtClean="0"/>
+              <a:t>Stop when no &lt;significant&gt; improvement</a:t>
+            </a:r>
+          </a:p>
+          <a:p>
+            <a:pPr lvl="1"/>
+            <a:r>
+              <a:rPr lang="en-US" dirty="0" smtClean="0"/>
+              <a:t>Stop when certain amount of time elapsed</a:t>
             </a:r>
             <a:endParaRPr lang="en-US" dirty="0"/>
           </a:p>
@@ -6007,7 +6035,7 @@
     </p:spTree>
     <p:extLst>
       <p:ext uri="{BB962C8B-B14F-4D97-AF65-F5344CB8AC3E}">
-        <p14:creationId xmlns:p14="http://schemas.microsoft.com/office/powerpoint/2010/main" val="3100896751"/>
+        <p14:creationId xmlns:p14="http://schemas.microsoft.com/office/powerpoint/2010/main" val="1114066969"/>
       </p:ext>
     </p:extLst>
   </p:cSld>
@@ -6021,6 +6049,78 @@
       </p:par>
     </p:tnLst>
   </p:timing>
+</p:sld>
+</file>
+
+<file path=ppt/slides/slide19.xml><?xml version="1.0" encoding="utf-8"?>
+<p:sld xmlns:a="http://schemas.openxmlformats.org/drawingml/2006/main" xmlns:r="http://schemas.openxmlformats.org/officeDocument/2006/relationships" xmlns:p="http://schemas.openxmlformats.org/presentationml/2006/main">
+  <p:cSld>
+    <p:spTree>
+      <p:nvGrpSpPr>
+        <p:cNvPr id="1" name=""/>
+        <p:cNvGrpSpPr/>
+        <p:nvPr/>
+      </p:nvGrpSpPr>
+      <p:grpSpPr>
+        <a:xfrm>
+          <a:off x="0" y="0"/>
+          <a:ext cx="0" cy="0"/>
+          <a:chOff x="0" y="0"/>
+          <a:chExt cx="0" cy="0"/>
+        </a:xfrm>
+      </p:grpSpPr>
+      <p:sp>
+        <p:nvSpPr>
+          <p:cNvPr id="2" name="Title 1"/>
+          <p:cNvSpPr>
+            <a:spLocks noGrp="1"/>
+          </p:cNvSpPr>
+          <p:nvPr>
+            <p:ph type="title"/>
+          </p:nvPr>
+        </p:nvSpPr>
+        <p:spPr/>
+        <p:txBody>
+          <a:bodyPr/>
+          <a:lstStyle/>
+          <a:p>
+            <a:r>
+              <a:rPr lang="en-US" dirty="0" smtClean="0"/>
+              <a:t>Decision Tree Parameters</a:t>
+            </a:r>
+            <a:endParaRPr lang="en-US" dirty="0"/>
+          </a:p>
+        </p:txBody>
+      </p:sp>
+      <p:sp>
+        <p:nvSpPr>
+          <p:cNvPr id="3" name="Content Placeholder 2"/>
+          <p:cNvSpPr>
+            <a:spLocks noGrp="1"/>
+          </p:cNvSpPr>
+          <p:nvPr>
+            <p:ph idx="1"/>
+          </p:nvPr>
+        </p:nvSpPr>
+        <p:spPr/>
+        <p:txBody>
+          <a:bodyPr/>
+          <a:lstStyle/>
+          <a:p>
+            <a:endParaRPr lang="en-US"/>
+          </a:p>
+        </p:txBody>
+      </p:sp>
+    </p:spTree>
+    <p:extLst>
+      <p:ext uri="{BB962C8B-B14F-4D97-AF65-F5344CB8AC3E}">
+        <p14:creationId xmlns:p14="http://schemas.microsoft.com/office/powerpoint/2010/main" val="1784418908"/>
+      </p:ext>
+    </p:extLst>
+  </p:cSld>
+  <p:clrMapOvr>
+    <a:masterClrMapping/>
+  </p:clrMapOvr>
 </p:sld>
 </file>
 
@@ -6109,6 +6209,463 @@
     <p:extLst>
       <p:ext uri="{BB962C8B-B14F-4D97-AF65-F5344CB8AC3E}">
         <p14:creationId xmlns:p14="http://schemas.microsoft.com/office/powerpoint/2010/main" val="293013500"/>
+      </p:ext>
+    </p:extLst>
+  </p:cSld>
+  <p:clrMapOvr>
+    <a:masterClrMapping/>
+  </p:clrMapOvr>
+  <p:timing>
+    <p:tnLst>
+      <p:par>
+        <p:cTn xmlns:p14="http://schemas.microsoft.com/office/powerpoint/2010/main" id="1" dur="indefinite" restart="never" nodeType="tmRoot"/>
+      </p:par>
+    </p:tnLst>
+  </p:timing>
+</p:sld>
+</file>
+
+<file path=ppt/slides/slide20.xml><?xml version="1.0" encoding="utf-8"?>
+<p:sld xmlns:a="http://schemas.openxmlformats.org/drawingml/2006/main" xmlns:r="http://schemas.openxmlformats.org/officeDocument/2006/relationships" xmlns:p="http://schemas.openxmlformats.org/presentationml/2006/main">
+  <p:cSld>
+    <p:spTree>
+      <p:nvGrpSpPr>
+        <p:cNvPr id="1" name=""/>
+        <p:cNvGrpSpPr/>
+        <p:nvPr/>
+      </p:nvGrpSpPr>
+      <p:grpSpPr>
+        <a:xfrm>
+          <a:off x="0" y="0"/>
+          <a:ext cx="0" cy="0"/>
+          <a:chOff x="0" y="0"/>
+          <a:chExt cx="0" cy="0"/>
+        </a:xfrm>
+      </p:grpSpPr>
+      <p:sp>
+        <p:nvSpPr>
+          <p:cNvPr id="2" name="Title 1"/>
+          <p:cNvSpPr>
+            <a:spLocks noGrp="1"/>
+          </p:cNvSpPr>
+          <p:nvPr>
+            <p:ph type="title"/>
+          </p:nvPr>
+        </p:nvSpPr>
+        <p:spPr/>
+        <p:txBody>
+          <a:bodyPr/>
+          <a:lstStyle/>
+          <a:p>
+            <a:r>
+              <a:rPr lang="en-US" dirty="0" smtClean="0"/>
+              <a:t>SVM Parameters</a:t>
+            </a:r>
+            <a:endParaRPr lang="en-US" dirty="0"/>
+          </a:p>
+        </p:txBody>
+      </p:sp>
+      <p:sp>
+        <p:nvSpPr>
+          <p:cNvPr id="3" name="Content Placeholder 2"/>
+          <p:cNvSpPr>
+            <a:spLocks noGrp="1"/>
+          </p:cNvSpPr>
+          <p:nvPr>
+            <p:ph idx="1"/>
+          </p:nvPr>
+        </p:nvSpPr>
+        <p:spPr/>
+        <p:txBody>
+          <a:bodyPr/>
+          <a:lstStyle/>
+          <a:p>
+            <a:r>
+              <a:rPr lang="en-US" dirty="0" smtClean="0"/>
+              <a:t>C</a:t>
+            </a:r>
+          </a:p>
+          <a:p>
+            <a:r>
+              <a:rPr lang="en-US" dirty="0" smtClean="0"/>
+              <a:t>Gamma</a:t>
+            </a:r>
+          </a:p>
+          <a:p>
+            <a:r>
+              <a:rPr lang="en-US" dirty="0" smtClean="0"/>
+              <a:t>Basis function</a:t>
+            </a:r>
+          </a:p>
+          <a:p>
+            <a:pPr lvl="1"/>
+            <a:r>
+              <a:rPr lang="en-US" dirty="0" smtClean="0"/>
+              <a:t>Linear</a:t>
+            </a:r>
+          </a:p>
+          <a:p>
+            <a:pPr lvl="1"/>
+            <a:r>
+              <a:rPr lang="en-US" dirty="0" smtClean="0"/>
+              <a:t>Radial</a:t>
+            </a:r>
+            <a:endParaRPr lang="en-US" dirty="0"/>
+          </a:p>
+        </p:txBody>
+      </p:sp>
+    </p:spTree>
+    <p:extLst>
+      <p:ext uri="{BB962C8B-B14F-4D97-AF65-F5344CB8AC3E}">
+        <p14:creationId xmlns:p14="http://schemas.microsoft.com/office/powerpoint/2010/main" val="4087623688"/>
+      </p:ext>
+    </p:extLst>
+  </p:cSld>
+  <p:clrMapOvr>
+    <a:masterClrMapping/>
+  </p:clrMapOvr>
+</p:sld>
+</file>
+
+<file path=ppt/slides/slide21.xml><?xml version="1.0" encoding="utf-8"?>
+<p:sld xmlns:a="http://schemas.openxmlformats.org/drawingml/2006/main" xmlns:r="http://schemas.openxmlformats.org/officeDocument/2006/relationships" xmlns:p="http://schemas.openxmlformats.org/presentationml/2006/main">
+  <p:cSld>
+    <p:spTree>
+      <p:nvGrpSpPr>
+        <p:cNvPr id="1" name=""/>
+        <p:cNvGrpSpPr/>
+        <p:nvPr/>
+      </p:nvGrpSpPr>
+      <p:grpSpPr>
+        <a:xfrm>
+          <a:off x="0" y="0"/>
+          <a:ext cx="0" cy="0"/>
+          <a:chOff x="0" y="0"/>
+          <a:chExt cx="0" cy="0"/>
+        </a:xfrm>
+      </p:grpSpPr>
+      <p:sp>
+        <p:nvSpPr>
+          <p:cNvPr id="2" name="Title 1"/>
+          <p:cNvSpPr>
+            <a:spLocks noGrp="1"/>
+          </p:cNvSpPr>
+          <p:nvPr>
+            <p:ph type="title"/>
+          </p:nvPr>
+        </p:nvSpPr>
+        <p:spPr/>
+        <p:txBody>
+          <a:bodyPr/>
+          <a:lstStyle/>
+          <a:p>
+            <a:r>
+              <a:rPr lang="en-US" dirty="0" smtClean="0"/>
+              <a:t>Performance Metrics</a:t>
+            </a:r>
+            <a:endParaRPr lang="en-US" dirty="0"/>
+          </a:p>
+        </p:txBody>
+      </p:sp>
+      <p:sp>
+        <p:nvSpPr>
+          <p:cNvPr id="3" name="Content Placeholder 2"/>
+          <p:cNvSpPr>
+            <a:spLocks noGrp="1"/>
+          </p:cNvSpPr>
+          <p:nvPr>
+            <p:ph idx="1"/>
+          </p:nvPr>
+        </p:nvSpPr>
+        <p:spPr/>
+        <p:txBody>
+          <a:bodyPr/>
+          <a:lstStyle/>
+          <a:p>
+            <a:r>
+              <a:rPr lang="en-US" dirty="0" smtClean="0"/>
+              <a:t>Precision </a:t>
+            </a:r>
+          </a:p>
+          <a:p>
+            <a:r>
+              <a:rPr lang="en-US" dirty="0" smtClean="0"/>
+              <a:t>Recall</a:t>
+            </a:r>
+          </a:p>
+          <a:p>
+            <a:r>
+              <a:rPr lang="en-US" dirty="0" smtClean="0"/>
+              <a:t>F1</a:t>
+            </a:r>
+            <a:endParaRPr lang="en-US" dirty="0"/>
+          </a:p>
+        </p:txBody>
+      </p:sp>
+    </p:spTree>
+    <p:extLst>
+      <p:ext uri="{BB962C8B-B14F-4D97-AF65-F5344CB8AC3E}">
+        <p14:creationId xmlns:p14="http://schemas.microsoft.com/office/powerpoint/2010/main" val="2348420852"/>
+      </p:ext>
+    </p:extLst>
+  </p:cSld>
+  <p:clrMapOvr>
+    <a:masterClrMapping/>
+  </p:clrMapOvr>
+</p:sld>
+</file>
+
+<file path=ppt/slides/slide22.xml><?xml version="1.0" encoding="utf-8"?>
+<p:sld xmlns:a="http://schemas.openxmlformats.org/drawingml/2006/main" xmlns:r="http://schemas.openxmlformats.org/officeDocument/2006/relationships" xmlns:p="http://schemas.openxmlformats.org/presentationml/2006/main">
+  <p:cSld>
+    <p:spTree>
+      <p:nvGrpSpPr>
+        <p:cNvPr id="1" name=""/>
+        <p:cNvGrpSpPr/>
+        <p:nvPr/>
+      </p:nvGrpSpPr>
+      <p:grpSpPr>
+        <a:xfrm>
+          <a:off x="0" y="0"/>
+          <a:ext cx="0" cy="0"/>
+          <a:chOff x="0" y="0"/>
+          <a:chExt cx="0" cy="0"/>
+        </a:xfrm>
+      </p:grpSpPr>
+      <p:sp>
+        <p:nvSpPr>
+          <p:cNvPr id="2" name="Title 1"/>
+          <p:cNvSpPr>
+            <a:spLocks noGrp="1"/>
+          </p:cNvSpPr>
+          <p:nvPr>
+            <p:ph type="title"/>
+          </p:nvPr>
+        </p:nvSpPr>
+        <p:spPr/>
+        <p:txBody>
+          <a:bodyPr/>
+          <a:lstStyle/>
+          <a:p>
+            <a:r>
+              <a:rPr lang="en-US" dirty="0" smtClean="0"/>
+              <a:t>After you get home</a:t>
+            </a:r>
+            <a:endParaRPr lang="en-US" dirty="0"/>
+          </a:p>
+        </p:txBody>
+      </p:sp>
+      <p:sp>
+        <p:nvSpPr>
+          <p:cNvPr id="3" name="Content Placeholder 2"/>
+          <p:cNvSpPr>
+            <a:spLocks noGrp="1"/>
+          </p:cNvSpPr>
+          <p:nvPr>
+            <p:ph idx="1"/>
+          </p:nvPr>
+        </p:nvSpPr>
+        <p:spPr/>
+        <p:txBody>
+          <a:bodyPr/>
+          <a:lstStyle/>
+          <a:p>
+            <a:r>
+              <a:rPr lang="en-US" dirty="0" smtClean="0"/>
+              <a:t>Code and slides are at:</a:t>
+            </a:r>
+          </a:p>
+          <a:p>
+            <a:r>
+              <a:rPr lang="en-US" dirty="0" smtClean="0"/>
+              <a:t>http://</a:t>
+            </a:r>
+            <a:r>
+              <a:rPr lang="en-US" dirty="0" err="1" smtClean="0"/>
+              <a:t>github.com</a:t>
+            </a:r>
+            <a:r>
+              <a:rPr lang="en-US" dirty="0" smtClean="0"/>
+              <a:t>/</a:t>
+            </a:r>
+            <a:r>
+              <a:rPr lang="en-US" dirty="0" err="1" smtClean="0"/>
+              <a:t>slowvak</a:t>
+            </a:r>
+            <a:endParaRPr lang="en-US" dirty="0"/>
+          </a:p>
+        </p:txBody>
+      </p:sp>
+    </p:spTree>
+    <p:extLst>
+      <p:ext uri="{BB962C8B-B14F-4D97-AF65-F5344CB8AC3E}">
+        <p14:creationId xmlns:p14="http://schemas.microsoft.com/office/powerpoint/2010/main" val="412197575"/>
+      </p:ext>
+    </p:extLst>
+  </p:cSld>
+  <p:clrMapOvr>
+    <a:masterClrMapping/>
+  </p:clrMapOvr>
+</p:sld>
+</file>
+
+<file path=ppt/slides/slide23.xml><?xml version="1.0" encoding="utf-8"?>
+<p:sld xmlns:a="http://schemas.openxmlformats.org/drawingml/2006/main" xmlns:r="http://schemas.openxmlformats.org/officeDocument/2006/relationships" xmlns:p="http://schemas.openxmlformats.org/presentationml/2006/main">
+  <p:cSld>
+    <p:spTree>
+      <p:nvGrpSpPr>
+        <p:cNvPr id="1" name=""/>
+        <p:cNvGrpSpPr/>
+        <p:nvPr/>
+      </p:nvGrpSpPr>
+      <p:grpSpPr>
+        <a:xfrm>
+          <a:off x="0" y="0"/>
+          <a:ext cx="0" cy="0"/>
+          <a:chOff x="0" y="0"/>
+          <a:chExt cx="0" cy="0"/>
+        </a:xfrm>
+      </p:grpSpPr>
+      <p:sp>
+        <p:nvSpPr>
+          <p:cNvPr id="2" name="Title 1"/>
+          <p:cNvSpPr>
+            <a:spLocks noGrp="1"/>
+          </p:cNvSpPr>
+          <p:nvPr>
+            <p:ph type="title"/>
+          </p:nvPr>
+        </p:nvSpPr>
+        <p:spPr/>
+        <p:txBody>
+          <a:bodyPr/>
+          <a:lstStyle/>
+          <a:p>
+            <a:r>
+              <a:rPr lang="en-US" dirty="0" smtClean="0"/>
+              <a:t>Questions</a:t>
+            </a:r>
+            <a:endParaRPr lang="en-US" dirty="0"/>
+          </a:p>
+        </p:txBody>
+      </p:sp>
+      <p:sp>
+        <p:nvSpPr>
+          <p:cNvPr id="3" name="Content Placeholder 2"/>
+          <p:cNvSpPr>
+            <a:spLocks noGrp="1"/>
+          </p:cNvSpPr>
+          <p:nvPr>
+            <p:ph idx="1"/>
+          </p:nvPr>
+        </p:nvSpPr>
+        <p:spPr/>
+        <p:txBody>
+          <a:bodyPr/>
+          <a:lstStyle/>
+          <a:p>
+            <a:endParaRPr lang="en-US"/>
+          </a:p>
+        </p:txBody>
+      </p:sp>
+    </p:spTree>
+    <p:extLst>
+      <p:ext uri="{BB962C8B-B14F-4D97-AF65-F5344CB8AC3E}">
+        <p14:creationId xmlns:p14="http://schemas.microsoft.com/office/powerpoint/2010/main" val="4073609037"/>
+      </p:ext>
+    </p:extLst>
+  </p:cSld>
+  <p:clrMapOvr>
+    <a:masterClrMapping/>
+  </p:clrMapOvr>
+  <p:timing>
+    <p:tnLst>
+      <p:par>
+        <p:cTn xmlns:p14="http://schemas.microsoft.com/office/powerpoint/2010/main" id="1" dur="indefinite" restart="never" nodeType="tmRoot"/>
+      </p:par>
+    </p:tnLst>
+  </p:timing>
+</p:sld>
+</file>
+
+<file path=ppt/slides/slide24.xml><?xml version="1.0" encoding="utf-8"?>
+<p:sld xmlns:a="http://schemas.openxmlformats.org/drawingml/2006/main" xmlns:r="http://schemas.openxmlformats.org/officeDocument/2006/relationships" xmlns:p="http://schemas.openxmlformats.org/presentationml/2006/main">
+  <p:cSld>
+    <p:spTree>
+      <p:nvGrpSpPr>
+        <p:cNvPr id="1" name=""/>
+        <p:cNvGrpSpPr/>
+        <p:nvPr/>
+      </p:nvGrpSpPr>
+      <p:grpSpPr>
+        <a:xfrm>
+          <a:off x="0" y="0"/>
+          <a:ext cx="0" cy="0"/>
+          <a:chOff x="0" y="0"/>
+          <a:chExt cx="0" cy="0"/>
+        </a:xfrm>
+      </p:grpSpPr>
+      <p:sp>
+        <p:nvSpPr>
+          <p:cNvPr id="2" name="Title 1"/>
+          <p:cNvSpPr>
+            <a:spLocks noGrp="1"/>
+          </p:cNvSpPr>
+          <p:nvPr>
+            <p:ph type="title"/>
+          </p:nvPr>
+        </p:nvSpPr>
+        <p:spPr/>
+        <p:txBody>
+          <a:bodyPr/>
+          <a:lstStyle/>
+          <a:p>
+            <a:r>
+              <a:rPr lang="en-US" dirty="0" smtClean="0"/>
+              <a:t>Starting Your Session</a:t>
+            </a:r>
+            <a:endParaRPr lang="en-US" dirty="0"/>
+          </a:p>
+        </p:txBody>
+      </p:sp>
+      <p:sp>
+        <p:nvSpPr>
+          <p:cNvPr id="3" name="TextBox 2"/>
+          <p:cNvSpPr txBox="1"/>
+          <p:nvPr/>
+        </p:nvSpPr>
+        <p:spPr>
+          <a:xfrm>
+            <a:off x="1211868" y="1409338"/>
+            <a:ext cx="967670" cy="369332"/>
+          </a:xfrm>
+          <a:prstGeom prst="rect">
+            <a:avLst/>
+          </a:prstGeom>
+          <a:noFill/>
+        </p:spPr>
+        <p:txBody>
+          <a:bodyPr wrap="none" rtlCol="0">
+            <a:spAutoFit/>
+          </a:bodyPr>
+          <a:lstStyle/>
+          <a:p>
+            <a:r>
+              <a:rPr lang="en-US" dirty="0" smtClean="0"/>
+              <a:t>Guide </a:t>
+            </a:r>
+            <a:r>
+              <a:rPr lang="is-IS" smtClean="0"/>
+              <a:t>…</a:t>
+            </a:r>
+            <a:endParaRPr lang="en-US" dirty="0"/>
+          </a:p>
+        </p:txBody>
+      </p:sp>
+    </p:spTree>
+    <p:extLst>
+      <p:ext uri="{BB962C8B-B14F-4D97-AF65-F5344CB8AC3E}">
+        <p14:creationId xmlns:p14="http://schemas.microsoft.com/office/powerpoint/2010/main" val="3100896751"/>
       </p:ext>
     </p:extLst>
   </p:cSld>

</xml_diff>